<commit_message>
small changes - mostly relocation of some files
</commit_message>
<xml_diff>
--- a/project presentation.pptx
+++ b/project presentation.pptx
@@ -5,7 +5,7 @@
     <p:sldMasterId id="2147483686" r:id="rId1"/>
   </p:sldMasterIdLst>
   <p:notesMasterIdLst>
-    <p:notesMasterId r:id="rId17"/>
+    <p:notesMasterId r:id="rId16"/>
   </p:notesMasterIdLst>
   <p:sldIdLst>
     <p:sldId id="256" r:id="rId2"/>
@@ -22,7 +22,6 @@
     <p:sldId id="268" r:id="rId13"/>
     <p:sldId id="272" r:id="rId14"/>
     <p:sldId id="269" r:id="rId15"/>
-    <p:sldId id="270" r:id="rId16"/>
   </p:sldIdLst>
   <p:sldSz cx="12192000" cy="6858000"/>
   <p:notesSz cx="6858000" cy="9144000"/>
@@ -273,7 +272,7 @@
           <a:p>
             <a:fld id="{78F86AAC-B219-4CCC-A5DB-F0D04424538E}" type="datetimeFigureOut">
               <a:rPr lang="en-IL" smtClean="0"/>
-              <a:t>30/04/2023</a:t>
+              <a:t>27/08/2023</a:t>
             </a:fld>
             <a:endParaRPr lang="en-IL"/>
           </a:p>
@@ -892,7 +891,7 @@
           <a:p>
             <a:fld id="{403CB87E-4591-47A1-9046-CF63F17215EF}" type="datetime2">
               <a:rPr lang="en-US" smtClean="0"/>
-              <a:t>Sunday, April 30, 2023</a:t>
+              <a:t>Sunday, August 27, 2023</a:t>
             </a:fld>
             <a:endParaRPr lang="en-US" dirty="0"/>
           </a:p>
@@ -1114,7 +1113,7 @@
           <a:p>
             <a:fld id="{2FA17F0E-8070-4DFE-A821-9A699EDBAD7E}" type="datetime2">
               <a:rPr lang="en-US" smtClean="0"/>
-              <a:t>Sunday, April 30, 2023</a:t>
+              <a:t>Sunday, August 27, 2023</a:t>
             </a:fld>
             <a:endParaRPr lang="en-US"/>
           </a:p>
@@ -1326,7 +1325,7 @@
           <a:p>
             <a:fld id="{D88D34AE-C7BF-46E5-A968-01C6641F6476}" type="datetime2">
               <a:rPr lang="en-US" smtClean="0"/>
-              <a:t>Sunday, April 30, 2023</a:t>
+              <a:t>Sunday, August 27, 2023</a:t>
             </a:fld>
             <a:endParaRPr lang="en-US"/>
           </a:p>
@@ -1567,7 +1566,7 @@
           <a:p>
             <a:fld id="{F33DE70B-B772-416E-A790-995760B1742E}" type="datetime2">
               <a:rPr lang="en-US" smtClean="0"/>
-              <a:t>Sunday, April 30, 2023</a:t>
+              <a:t>Sunday, August 27, 2023</a:t>
             </a:fld>
             <a:endParaRPr lang="en-US" dirty="0"/>
           </a:p>
@@ -1866,7 +1865,7 @@
           <a:p>
             <a:fld id="{76760CDE-A6F1-4138-AF12-ED09E8E5FB6B}" type="datetime2">
               <a:rPr lang="en-US" smtClean="0"/>
-              <a:t>Sunday, April 30, 2023</a:t>
+              <a:t>Sunday, August 27, 2023</a:t>
             </a:fld>
             <a:endParaRPr lang="en-US"/>
           </a:p>
@@ -2198,7 +2197,7 @@
           <a:p>
             <a:fld id="{DB15F8B1-DB7B-4D28-A97D-40FB2DD1EF78}" type="datetime2">
               <a:rPr lang="en-US" smtClean="0"/>
-              <a:t>Sunday, April 30, 2023</a:t>
+              <a:t>Sunday, August 27, 2023</a:t>
             </a:fld>
             <a:endParaRPr lang="en-US"/>
           </a:p>
@@ -2644,7 +2643,7 @@
           <a:p>
             <a:fld id="{14039161-23B8-4738-9069-73EBE8884FDD}" type="datetime2">
               <a:rPr lang="en-US" smtClean="0"/>
-              <a:t>Sunday, April 30, 2023</a:t>
+              <a:t>Sunday, August 27, 2023</a:t>
             </a:fld>
             <a:endParaRPr lang="en-US"/>
           </a:p>
@@ -2800,7 +2799,7 @@
           <a:p>
             <a:fld id="{FA994D44-7693-499F-AC6C-11696134FE3F}" type="datetime2">
               <a:rPr lang="en-US" smtClean="0"/>
-              <a:t>Sunday, April 30, 2023</a:t>
+              <a:t>Sunday, August 27, 2023</a:t>
             </a:fld>
             <a:endParaRPr lang="en-US"/>
           </a:p>
@@ -2917,7 +2916,7 @@
           <a:p>
             <a:fld id="{363AF2AE-472C-4EF3-ABB2-24BAA9AE3CF7}" type="datetime2">
               <a:rPr lang="en-US" smtClean="0"/>
-              <a:t>Sunday, April 30, 2023</a:t>
+              <a:t>Sunday, August 27, 2023</a:t>
             </a:fld>
             <a:endParaRPr lang="en-US"/>
           </a:p>
@@ -3244,7 +3243,7 @@
           <a:p>
             <a:fld id="{EAEA162C-A7C1-4263-9453-1BAFF8C39559}" type="datetime2">
               <a:rPr lang="en-US" smtClean="0"/>
-              <a:t>Sunday, April 30, 2023</a:t>
+              <a:t>Sunday, August 27, 2023</a:t>
             </a:fld>
             <a:endParaRPr lang="en-US"/>
           </a:p>
@@ -3550,7 +3549,7 @@
           <a:p>
             <a:fld id="{64DF6793-3458-4587-8168-65F0C37A92D2}" type="datetime2">
               <a:rPr lang="en-US" smtClean="0"/>
-              <a:t>Sunday, April 30, 2023</a:t>
+              <a:t>Sunday, August 27, 2023</a:t>
             </a:fld>
             <a:endParaRPr lang="en-US"/>
           </a:p>
@@ -3903,7 +3902,7 @@
             <a:fld id="{E8352ED3-3C46-4C9A-9738-67B2D875E7E2}" type="datetime2">
               <a:rPr lang="en-US" smtClean="0"/>
               <a:pPr/>
-              <a:t>Sunday, April 30, 2023</a:t>
+              <a:t>Sunday, August 27, 2023</a:t>
             </a:fld>
             <a:endParaRPr lang="en-US" dirty="0"/>
           </a:p>
@@ -5788,7 +5787,7 @@
         </p:blipFill>
         <p:spPr>
           <a:xfrm>
-            <a:off x="6614610" y="1480494"/>
+            <a:off x="6619771" y="1501828"/>
             <a:ext cx="5570703" cy="3802710"/>
           </a:xfrm>
           <a:prstGeom prst="rect">
@@ -9941,110 +9940,6 @@
     <p:extLst>
       <p:ext uri="{BB962C8B-B14F-4D97-AF65-F5344CB8AC3E}">
         <p14:creationId xmlns:p14="http://schemas.microsoft.com/office/powerpoint/2010/main" val="672923031"/>
-      </p:ext>
-    </p:extLst>
-  </p:cSld>
-  <p:clrMapOvr>
-    <a:masterClrMapping/>
-  </p:clrMapOvr>
-</p:sld>
-</file>
-
-<file path=ppt/slides/slide15.xml><?xml version="1.0" encoding="utf-8"?>
-<p:sld xmlns:a="http://schemas.openxmlformats.org/drawingml/2006/main" xmlns:r="http://schemas.openxmlformats.org/officeDocument/2006/relationships" xmlns:p="http://schemas.openxmlformats.org/presentationml/2006/main">
-  <p:cSld>
-    <p:spTree>
-      <p:nvGrpSpPr>
-        <p:cNvPr id="1" name=""/>
-        <p:cNvGrpSpPr/>
-        <p:nvPr/>
-      </p:nvGrpSpPr>
-      <p:grpSpPr>
-        <a:xfrm>
-          <a:off x="0" y="0"/>
-          <a:ext cx="0" cy="0"/>
-          <a:chOff x="0" y="0"/>
-          <a:chExt cx="0" cy="0"/>
-        </a:xfrm>
-      </p:grpSpPr>
-      <p:sp>
-        <p:nvSpPr>
-          <p:cNvPr id="2" name="Title 1">
-            <a:extLst>
-              <a:ext uri="{FF2B5EF4-FFF2-40B4-BE49-F238E27FC236}">
-                <a16:creationId xmlns:a16="http://schemas.microsoft.com/office/drawing/2014/main" id="{71785A80-E216-65AC-3FBD-22B816BBB028}"/>
-              </a:ext>
-            </a:extLst>
-          </p:cNvPr>
-          <p:cNvSpPr>
-            <a:spLocks noGrp="1"/>
-          </p:cNvSpPr>
-          <p:nvPr>
-            <p:ph type="title"/>
-          </p:nvPr>
-        </p:nvSpPr>
-        <p:spPr/>
-        <p:txBody>
-          <a:bodyPr/>
-          <a:lstStyle/>
-          <a:p>
-            <a:r>
-              <a:rPr lang="en-US" dirty="0"/>
-              <a:t>Let’s see it in action:</a:t>
-            </a:r>
-            <a:endParaRPr lang="en-IL" dirty="0"/>
-          </a:p>
-        </p:txBody>
-      </p:sp>
-      <p:sp>
-        <p:nvSpPr>
-          <p:cNvPr id="3" name="Content Placeholder 2">
-            <a:extLst>
-              <a:ext uri="{FF2B5EF4-FFF2-40B4-BE49-F238E27FC236}">
-                <a16:creationId xmlns:a16="http://schemas.microsoft.com/office/drawing/2014/main" id="{9E3E16AF-3CD8-3E49-853B-525FEFE07426}"/>
-              </a:ext>
-            </a:extLst>
-          </p:cNvPr>
-          <p:cNvSpPr>
-            <a:spLocks noGrp="1"/>
-          </p:cNvSpPr>
-          <p:nvPr>
-            <p:ph idx="1"/>
-          </p:nvPr>
-        </p:nvSpPr>
-        <p:spPr/>
-        <p:txBody>
-          <a:bodyPr/>
-          <a:lstStyle/>
-          <a:p>
-            <a:r>
-              <a:rPr lang="en-US" dirty="0">
-                <a:solidFill>
-                  <a:schemeClr val="tx1">
-                    <a:lumMod val="75000"/>
-                    <a:lumOff val="25000"/>
-                  </a:schemeClr>
-                </a:solidFill>
-                <a:latin typeface="Söhne"/>
-              </a:rPr>
-              <a:t>Need to insert here video of using the app.</a:t>
-            </a:r>
-            <a:endParaRPr lang="en-IL" dirty="0">
-              <a:solidFill>
-                <a:schemeClr val="tx1">
-                  <a:lumMod val="75000"/>
-                  <a:lumOff val="25000"/>
-                </a:schemeClr>
-              </a:solidFill>
-              <a:latin typeface="Söhne"/>
-            </a:endParaRPr>
-          </a:p>
-        </p:txBody>
-      </p:sp>
-    </p:spTree>
-    <p:extLst>
-      <p:ext uri="{BB962C8B-B14F-4D97-AF65-F5344CB8AC3E}">
-        <p14:creationId xmlns:p14="http://schemas.microsoft.com/office/powerpoint/2010/main" val="2137219220"/>
       </p:ext>
     </p:extLst>
   </p:cSld>

</xml_diff>